<commit_message>
back button increased size
</commit_message>
<xml_diff>
--- a/Xenophile.pptx
+++ b/Xenophile.pptx
@@ -122,6 +122,10 @@
 </p:presentation>
 </file>
 
+<file path=ppt/revisionInfo.xml><?xml version="1.0" encoding="utf-8"?>
+<p1510:revInfo xmlns:a="http://schemas.openxmlformats.org/drawingml/2006/main" xmlns:r="http://schemas.openxmlformats.org/officeDocument/2006/relationships" xmlns:p1510="http://schemas.microsoft.com/office/powerpoint/2015/10/main"/>
+</file>
+
 <file path=ppt/notesMasters/notesMaster1.xml><?xml version="1.0" encoding="utf-8"?>
 <p:notesMaster xmlns:a="http://schemas.openxmlformats.org/drawingml/2006/main" xmlns:r="http://schemas.openxmlformats.org/officeDocument/2006/relationships" xmlns:p="http://schemas.openxmlformats.org/presentationml/2006/main">
   <p:cSld>
@@ -363,7 +367,7 @@
           <a:p>
             <a:fld id="{E438869D-DAC5-4AD8-A278-FCDAF9BB0A57}" type="slidenum">
               <a:rPr lang="de-CH" smtClean="0"/>
-              <a:t>‹#›</a:t>
+              <a:t>‹Nr.›</a:t>
             </a:fld>
             <a:endParaRPr lang="de-CH"/>
           </a:p>
@@ -677,7 +681,7 @@
           <a:p>
             <a:fld id="{6276909F-0980-4C2D-A506-D68E2E613C99}" type="slidenum">
               <a:rPr lang="de-CH" smtClean="0"/>
-              <a:t>‹#›</a:t>
+              <a:t>‹Nr.›</a:t>
             </a:fld>
             <a:endParaRPr lang="de-CH"/>
           </a:p>
@@ -879,7 +883,7 @@
           <a:p>
             <a:fld id="{6276909F-0980-4C2D-A506-D68E2E613C99}" type="slidenum">
               <a:rPr lang="de-CH" smtClean="0"/>
-              <a:t>‹#›</a:t>
+              <a:t>‹Nr.›</a:t>
             </a:fld>
             <a:endParaRPr lang="de-CH"/>
           </a:p>
@@ -1091,7 +1095,7 @@
           <a:p>
             <a:fld id="{6276909F-0980-4C2D-A506-D68E2E613C99}" type="slidenum">
               <a:rPr lang="de-CH" smtClean="0"/>
-              <a:t>‹#›</a:t>
+              <a:t>‹Nr.›</a:t>
             </a:fld>
             <a:endParaRPr lang="de-CH"/>
           </a:p>
@@ -1293,7 +1297,7 @@
           <a:p>
             <a:fld id="{6276909F-0980-4C2D-A506-D68E2E613C99}" type="slidenum">
               <a:rPr lang="de-CH" smtClean="0"/>
-              <a:t>‹#›</a:t>
+              <a:t>‹Nr.›</a:t>
             </a:fld>
             <a:endParaRPr lang="de-CH"/>
           </a:p>
@@ -1576,7 +1580,7 @@
           <a:p>
             <a:fld id="{6276909F-0980-4C2D-A506-D68E2E613C99}" type="slidenum">
               <a:rPr lang="de-CH" smtClean="0"/>
-              <a:t>‹#›</a:t>
+              <a:t>‹Nr.›</a:t>
             </a:fld>
             <a:endParaRPr lang="de-CH"/>
           </a:p>
@@ -1846,7 +1850,7 @@
           <a:p>
             <a:fld id="{6276909F-0980-4C2D-A506-D68E2E613C99}" type="slidenum">
               <a:rPr lang="de-CH" smtClean="0"/>
-              <a:t>‹#›</a:t>
+              <a:t>‹Nr.›</a:t>
             </a:fld>
             <a:endParaRPr lang="de-CH"/>
           </a:p>
@@ -2263,7 +2267,7 @@
           <a:p>
             <a:fld id="{6276909F-0980-4C2D-A506-D68E2E613C99}" type="slidenum">
               <a:rPr lang="de-CH" smtClean="0"/>
-              <a:t>‹#›</a:t>
+              <a:t>‹Nr.›</a:t>
             </a:fld>
             <a:endParaRPr lang="de-CH"/>
           </a:p>
@@ -2407,7 +2411,7 @@
           <a:p>
             <a:fld id="{6276909F-0980-4C2D-A506-D68E2E613C99}" type="slidenum">
               <a:rPr lang="de-CH" smtClean="0"/>
-              <a:t>‹#›</a:t>
+              <a:t>‹Nr.›</a:t>
             </a:fld>
             <a:endParaRPr lang="de-CH"/>
           </a:p>
@@ -2522,7 +2526,7 @@
           <a:p>
             <a:fld id="{6276909F-0980-4C2D-A506-D68E2E613C99}" type="slidenum">
               <a:rPr lang="de-CH" smtClean="0"/>
-              <a:t>‹#›</a:t>
+              <a:t>‹Nr.›</a:t>
             </a:fld>
             <a:endParaRPr lang="de-CH"/>
           </a:p>
@@ -2837,7 +2841,7 @@
           <a:p>
             <a:fld id="{6276909F-0980-4C2D-A506-D68E2E613C99}" type="slidenum">
               <a:rPr lang="de-CH" smtClean="0"/>
-              <a:t>‹#›</a:t>
+              <a:t>‹Nr.›</a:t>
             </a:fld>
             <a:endParaRPr lang="de-CH"/>
           </a:p>
@@ -3128,7 +3132,7 @@
           <a:p>
             <a:fld id="{6276909F-0980-4C2D-A506-D68E2E613C99}" type="slidenum">
               <a:rPr lang="de-CH" smtClean="0"/>
-              <a:t>‹#›</a:t>
+              <a:t>‹Nr.›</a:t>
             </a:fld>
             <a:endParaRPr lang="de-CH"/>
           </a:p>
@@ -3409,7 +3413,7 @@
           <a:p>
             <a:fld id="{6276909F-0980-4C2D-A506-D68E2E613C99}" type="slidenum">
               <a:rPr lang="de-CH" smtClean="0"/>
-              <a:t>‹#›</a:t>
+              <a:t>‹Nr.›</a:t>
             </a:fld>
             <a:endParaRPr lang="de-CH"/>
           </a:p>
@@ -4806,7 +4810,7 @@
         </p:blipFill>
         <p:spPr>
           <a:xfrm>
-            <a:off x="6886482" y="3596481"/>
+            <a:off x="5169649" y="3717779"/>
             <a:ext cx="3124200" cy="809625"/>
           </a:xfrm>
           <a:prstGeom prst="rect">
@@ -4929,6 +4933,36 @@
           </a:p>
         </p:txBody>
       </p:sp>
+      <p:pic>
+        <p:nvPicPr>
+          <p:cNvPr id="9" name="Grafik 8">
+            <a:extLst>
+              <a:ext uri="{FF2B5EF4-FFF2-40B4-BE49-F238E27FC236}">
+                <a16:creationId xmlns:a16="http://schemas.microsoft.com/office/drawing/2014/main" id="{A53F96CE-C7CA-42A9-BD43-77F3CC6640F9}"/>
+              </a:ext>
+            </a:extLst>
+          </p:cNvPr>
+          <p:cNvPicPr>
+            <a:picLocks noChangeAspect="1"/>
+          </p:cNvPicPr>
+          <p:nvPr/>
+        </p:nvPicPr>
+        <p:blipFill>
+          <a:blip r:embed="rId4"/>
+          <a:stretch>
+            <a:fillRect/>
+          </a:stretch>
+        </p:blipFill>
+        <p:spPr>
+          <a:xfrm>
+            <a:off x="8512341" y="5010547"/>
+            <a:ext cx="2238375" cy="561975"/>
+          </a:xfrm>
+          <a:prstGeom prst="rect">
+            <a:avLst/>
+          </a:prstGeom>
+        </p:spPr>
+      </p:pic>
     </p:spTree>
     <p:extLst>
       <p:ext uri="{BB962C8B-B14F-4D97-AF65-F5344CB8AC3E}">
@@ -5110,6 +5144,42 @@
           </a:p>
         </p:txBody>
       </p:sp>
+      <p:pic>
+        <p:nvPicPr>
+          <p:cNvPr id="8" name="Grafik 7">
+            <a:extLst>
+              <a:ext uri="{FF2B5EF4-FFF2-40B4-BE49-F238E27FC236}">
+                <a16:creationId xmlns:a16="http://schemas.microsoft.com/office/drawing/2014/main" id="{EB40CC01-56E5-45A2-A376-5E0E48FC8F5B}"/>
+              </a:ext>
+            </a:extLst>
+          </p:cNvPr>
+          <p:cNvPicPr>
+            <a:picLocks noChangeAspect="1"/>
+          </p:cNvPicPr>
+          <p:nvPr/>
+        </p:nvPicPr>
+        <p:blipFill>
+          <a:blip r:embed="rId2">
+            <a:extLst>
+              <a:ext uri="{28A0092B-C50C-407E-A947-70E740481C1C}">
+                <a14:useLocalDpi xmlns:a14="http://schemas.microsoft.com/office/drawing/2010/main" val="0"/>
+              </a:ext>
+            </a:extLst>
+          </a:blip>
+          <a:stretch>
+            <a:fillRect/>
+          </a:stretch>
+        </p:blipFill>
+        <p:spPr>
+          <a:xfrm>
+            <a:off x="2370465" y="2435288"/>
+            <a:ext cx="6698890" cy="3641393"/>
+          </a:xfrm>
+          <a:prstGeom prst="rect">
+            <a:avLst/>
+          </a:prstGeom>
+        </p:spPr>
+      </p:pic>
     </p:spTree>
     <p:extLst>
       <p:ext uri="{BB962C8B-B14F-4D97-AF65-F5344CB8AC3E}">

</xml_diff>